<commit_message>
Small changes to the date of the workshop
</commit_message>
<xml_diff>
--- a/lessons/An Introduction to probability distributions.pptx
+++ b/lessons/An Introduction to probability distributions.pptx
@@ -292,7 +292,7 @@
           <a:p>
             <a:fld id="{14178DB6-65FC-4F28-84C6-47493D980159}" type="datetimeFigureOut">
               <a:rPr lang="en-US" smtClean="0"/>
-              <a:t>8/5/2020</a:t>
+              <a:t>8/7/2020</a:t>
             </a:fld>
             <a:endParaRPr lang="en-US"/>
           </a:p>
@@ -490,7 +490,7 @@
           <a:p>
             <a:fld id="{14178DB6-65FC-4F28-84C6-47493D980159}" type="datetimeFigureOut">
               <a:rPr lang="en-US" smtClean="0"/>
-              <a:t>8/5/2020</a:t>
+              <a:t>8/7/2020</a:t>
             </a:fld>
             <a:endParaRPr lang="en-US"/>
           </a:p>
@@ -698,7 +698,7 @@
           <a:p>
             <a:fld id="{14178DB6-65FC-4F28-84C6-47493D980159}" type="datetimeFigureOut">
               <a:rPr lang="en-US" smtClean="0"/>
-              <a:t>8/5/2020</a:t>
+              <a:t>8/7/2020</a:t>
             </a:fld>
             <a:endParaRPr lang="en-US"/>
           </a:p>
@@ -896,7 +896,7 @@
           <a:p>
             <a:fld id="{14178DB6-65FC-4F28-84C6-47493D980159}" type="datetimeFigureOut">
               <a:rPr lang="en-US" smtClean="0"/>
-              <a:t>8/5/2020</a:t>
+              <a:t>8/7/2020</a:t>
             </a:fld>
             <a:endParaRPr lang="en-US"/>
           </a:p>
@@ -1171,7 +1171,7 @@
           <a:p>
             <a:fld id="{14178DB6-65FC-4F28-84C6-47493D980159}" type="datetimeFigureOut">
               <a:rPr lang="en-US" smtClean="0"/>
-              <a:t>8/5/2020</a:t>
+              <a:t>8/7/2020</a:t>
             </a:fld>
             <a:endParaRPr lang="en-US"/>
           </a:p>
@@ -1436,7 +1436,7 @@
           <a:p>
             <a:fld id="{14178DB6-65FC-4F28-84C6-47493D980159}" type="datetimeFigureOut">
               <a:rPr lang="en-US" smtClean="0"/>
-              <a:t>8/5/2020</a:t>
+              <a:t>8/7/2020</a:t>
             </a:fld>
             <a:endParaRPr lang="en-US"/>
           </a:p>
@@ -1848,7 +1848,7 @@
           <a:p>
             <a:fld id="{14178DB6-65FC-4F28-84C6-47493D980159}" type="datetimeFigureOut">
               <a:rPr lang="en-US" smtClean="0"/>
-              <a:t>8/5/2020</a:t>
+              <a:t>8/7/2020</a:t>
             </a:fld>
             <a:endParaRPr lang="en-US"/>
           </a:p>
@@ -1989,7 +1989,7 @@
           <a:p>
             <a:fld id="{14178DB6-65FC-4F28-84C6-47493D980159}" type="datetimeFigureOut">
               <a:rPr lang="en-US" smtClean="0"/>
-              <a:t>8/5/2020</a:t>
+              <a:t>8/7/2020</a:t>
             </a:fld>
             <a:endParaRPr lang="en-US"/>
           </a:p>
@@ -2102,7 +2102,7 @@
           <a:p>
             <a:fld id="{14178DB6-65FC-4F28-84C6-47493D980159}" type="datetimeFigureOut">
               <a:rPr lang="en-US" smtClean="0"/>
-              <a:t>8/5/2020</a:t>
+              <a:t>8/7/2020</a:t>
             </a:fld>
             <a:endParaRPr lang="en-US"/>
           </a:p>
@@ -2413,7 +2413,7 @@
           <a:p>
             <a:fld id="{14178DB6-65FC-4F28-84C6-47493D980159}" type="datetimeFigureOut">
               <a:rPr lang="en-US" smtClean="0"/>
-              <a:t>8/5/2020</a:t>
+              <a:t>8/7/2020</a:t>
             </a:fld>
             <a:endParaRPr lang="en-US"/>
           </a:p>
@@ -2701,7 +2701,7 @@
           <a:p>
             <a:fld id="{14178DB6-65FC-4F28-84C6-47493D980159}" type="datetimeFigureOut">
               <a:rPr lang="en-US" smtClean="0"/>
-              <a:t>8/5/2020</a:t>
+              <a:t>8/7/2020</a:t>
             </a:fld>
             <a:endParaRPr lang="en-US"/>
           </a:p>
@@ -2942,7 +2942,7 @@
           <a:p>
             <a:fld id="{14178DB6-65FC-4F28-84C6-47493D980159}" type="datetimeFigureOut">
               <a:rPr lang="en-US" smtClean="0"/>
-              <a:t>8/5/2020</a:t>
+              <a:t>8/7/2020</a:t>
             </a:fld>
             <a:endParaRPr lang="en-US"/>
           </a:p>
@@ -3428,7 +3428,7 @@
           <a:p>
             <a:r>
               <a:rPr lang="en-US" dirty="0"/>
-              <a:t>8/11/2020</a:t>
+              <a:t>8/10/2020</a:t>
             </a:r>
           </a:p>
         </p:txBody>

</xml_diff>